<commit_message>
2nd Capstone Project Presentation
</commit_message>
<xml_diff>
--- a/2nd_Capstone_Presentation.pptx
+++ b/2nd_Capstone_Presentation.pptx
@@ -17,6 +17,8 @@
     <p:sldId id="262" r:id="rId11"/>
     <p:sldId id="269" r:id="rId12"/>
     <p:sldId id="270" r:id="rId13"/>
+    <p:sldId id="271" r:id="rId14"/>
+    <p:sldId id="272" r:id="rId15"/>
   </p:sldIdLst>
   <p:sldSz cx="12192000" cy="6858000"/>
   <p:notesSz cx="6858000" cy="9144000"/>
@@ -270,7 +272,7 @@
           <a:p>
             <a:fld id="{98DB2294-ECB0-4B8A-842C-9558545BA8B8}" type="datetimeFigureOut">
               <a:rPr lang="ru-RU" smtClean="0"/>
-              <a:t>04.03.2018</a:t>
+              <a:t>20.03.2018</a:t>
             </a:fld>
             <a:endParaRPr lang="ru-RU"/>
           </a:p>
@@ -468,7 +470,7 @@
           <a:p>
             <a:fld id="{98DB2294-ECB0-4B8A-842C-9558545BA8B8}" type="datetimeFigureOut">
               <a:rPr lang="ru-RU" smtClean="0"/>
-              <a:t>04.03.2018</a:t>
+              <a:t>20.03.2018</a:t>
             </a:fld>
             <a:endParaRPr lang="ru-RU"/>
           </a:p>
@@ -676,7 +678,7 @@
           <a:p>
             <a:fld id="{98DB2294-ECB0-4B8A-842C-9558545BA8B8}" type="datetimeFigureOut">
               <a:rPr lang="ru-RU" smtClean="0"/>
-              <a:t>04.03.2018</a:t>
+              <a:t>20.03.2018</a:t>
             </a:fld>
             <a:endParaRPr lang="ru-RU"/>
           </a:p>
@@ -874,7 +876,7 @@
           <a:p>
             <a:fld id="{98DB2294-ECB0-4B8A-842C-9558545BA8B8}" type="datetimeFigureOut">
               <a:rPr lang="ru-RU" smtClean="0"/>
-              <a:t>04.03.2018</a:t>
+              <a:t>20.03.2018</a:t>
             </a:fld>
             <a:endParaRPr lang="ru-RU"/>
           </a:p>
@@ -1149,7 +1151,7 @@
           <a:p>
             <a:fld id="{98DB2294-ECB0-4B8A-842C-9558545BA8B8}" type="datetimeFigureOut">
               <a:rPr lang="ru-RU" smtClean="0"/>
-              <a:t>04.03.2018</a:t>
+              <a:t>20.03.2018</a:t>
             </a:fld>
             <a:endParaRPr lang="ru-RU"/>
           </a:p>
@@ -1414,7 +1416,7 @@
           <a:p>
             <a:fld id="{98DB2294-ECB0-4B8A-842C-9558545BA8B8}" type="datetimeFigureOut">
               <a:rPr lang="ru-RU" smtClean="0"/>
-              <a:t>04.03.2018</a:t>
+              <a:t>20.03.2018</a:t>
             </a:fld>
             <a:endParaRPr lang="ru-RU"/>
           </a:p>
@@ -1826,7 +1828,7 @@
           <a:p>
             <a:fld id="{98DB2294-ECB0-4B8A-842C-9558545BA8B8}" type="datetimeFigureOut">
               <a:rPr lang="ru-RU" smtClean="0"/>
-              <a:t>04.03.2018</a:t>
+              <a:t>20.03.2018</a:t>
             </a:fld>
             <a:endParaRPr lang="ru-RU"/>
           </a:p>
@@ -1967,7 +1969,7 @@
           <a:p>
             <a:fld id="{98DB2294-ECB0-4B8A-842C-9558545BA8B8}" type="datetimeFigureOut">
               <a:rPr lang="ru-RU" smtClean="0"/>
-              <a:t>04.03.2018</a:t>
+              <a:t>20.03.2018</a:t>
             </a:fld>
             <a:endParaRPr lang="ru-RU"/>
           </a:p>
@@ -2080,7 +2082,7 @@
           <a:p>
             <a:fld id="{98DB2294-ECB0-4B8A-842C-9558545BA8B8}" type="datetimeFigureOut">
               <a:rPr lang="ru-RU" smtClean="0"/>
-              <a:t>04.03.2018</a:t>
+              <a:t>20.03.2018</a:t>
             </a:fld>
             <a:endParaRPr lang="ru-RU"/>
           </a:p>
@@ -2391,7 +2393,7 @@
           <a:p>
             <a:fld id="{98DB2294-ECB0-4B8A-842C-9558545BA8B8}" type="datetimeFigureOut">
               <a:rPr lang="ru-RU" smtClean="0"/>
-              <a:t>04.03.2018</a:t>
+              <a:t>20.03.2018</a:t>
             </a:fld>
             <a:endParaRPr lang="ru-RU"/>
           </a:p>
@@ -2679,7 +2681,7 @@
           <a:p>
             <a:fld id="{98DB2294-ECB0-4B8A-842C-9558545BA8B8}" type="datetimeFigureOut">
               <a:rPr lang="ru-RU" smtClean="0"/>
-              <a:t>04.03.2018</a:t>
+              <a:t>20.03.2018</a:t>
             </a:fld>
             <a:endParaRPr lang="ru-RU"/>
           </a:p>
@@ -2920,7 +2922,7 @@
           <a:p>
             <a:fld id="{98DB2294-ECB0-4B8A-842C-9558545BA8B8}" type="datetimeFigureOut">
               <a:rPr lang="ru-RU" smtClean="0"/>
-              <a:t>04.03.2018</a:t>
+              <a:t>20.03.2018</a:t>
             </a:fld>
             <a:endParaRPr lang="ru-RU"/>
           </a:p>
@@ -3881,7 +3883,7 @@
           <a:graphicData uri="http://schemas.openxmlformats.org/presentationml/2006/ole">
             <mc:AlternateContent xmlns:mc="http://schemas.openxmlformats.org/markup-compatibility/2006">
               <mc:Choice xmlns:v="urn:schemas-microsoft-com:vml" Requires="v">
-                <p:oleObj spid="_x0000_s3090" name="Acrobat Document" r:id="rId3" imgW="6857708" imgH="6857716" progId="AcroExch.Document.11">
+                <p:oleObj spid="_x0000_s3096" name="Acrobat Document" r:id="rId3" imgW="6857708" imgH="6857716" progId="AcroExch.Document.11">
                   <p:embed/>
                 </p:oleObj>
               </mc:Choice>
@@ -3950,7 +3952,7 @@
           <a:graphicData uri="http://schemas.openxmlformats.org/presentationml/2006/ole">
             <mc:AlternateContent xmlns:mc="http://schemas.openxmlformats.org/markup-compatibility/2006">
               <mc:Choice xmlns:v="urn:schemas-microsoft-com:vml" Requires="v">
-                <p:oleObj spid="_x0000_s3091" name="Acrobat Document" r:id="rId5" imgW="6857708" imgH="6857716" progId="AcroExch.Document.11">
+                <p:oleObj spid="_x0000_s3097" name="Acrobat Document" r:id="rId5" imgW="6857708" imgH="6857716" progId="AcroExch.Document.11">
                   <p:embed/>
                 </p:oleObj>
               </mc:Choice>
@@ -3998,6 +4000,265 @@
 </p:sld>
 </file>
 
+<file path=ppt/slides/slide13.xml><?xml version="1.0" encoding="utf-8"?>
+<p:sld xmlns:a="http://schemas.openxmlformats.org/drawingml/2006/main" xmlns:r="http://schemas.openxmlformats.org/officeDocument/2006/relationships" xmlns:p="http://schemas.openxmlformats.org/presentationml/2006/main">
+  <p:cSld>
+    <p:spTree>
+      <p:nvGrpSpPr>
+        <p:cNvPr id="1" name=""/>
+        <p:cNvGrpSpPr/>
+        <p:nvPr/>
+      </p:nvGrpSpPr>
+      <p:grpSpPr>
+        <a:xfrm>
+          <a:off x="0" y="0"/>
+          <a:ext cx="0" cy="0"/>
+          <a:chOff x="0" y="0"/>
+          <a:chExt cx="0" cy="0"/>
+        </a:xfrm>
+      </p:grpSpPr>
+      <p:sp>
+        <p:nvSpPr>
+          <p:cNvPr id="2" name="Прямоугольник 1">
+            <a:extLst>
+              <a:ext uri="{FF2B5EF4-FFF2-40B4-BE49-F238E27FC236}">
+                <a16:creationId xmlns:a16="http://schemas.microsoft.com/office/drawing/2014/main" id="{61935E86-E136-41E5-B438-E8914B66B5B3}"/>
+              </a:ext>
+            </a:extLst>
+          </p:cNvPr>
+          <p:cNvSpPr/>
+          <p:nvPr/>
+        </p:nvSpPr>
+        <p:spPr>
+          <a:xfrm>
+            <a:off x="1371600" y="797510"/>
+            <a:ext cx="9867900" cy="5693866"/>
+          </a:xfrm>
+          <a:prstGeom prst="rect">
+            <a:avLst/>
+          </a:prstGeom>
+        </p:spPr>
+        <p:txBody>
+          <a:bodyPr wrap="square">
+            <a:spAutoFit/>
+          </a:bodyPr>
+          <a:lstStyle/>
+          <a:p>
+            <a:pPr marL="285750" indent="-285750">
+              <a:buFont typeface="Wingdings" panose="05000000000000000000" pitchFamily="2" charset="2"/>
+              <a:buChar char="q"/>
+            </a:pPr>
+            <a:r>
+              <a:rPr lang="en-US" sz="2800" dirty="0"/>
+              <a:t>Question: Where do the slowest trips originate and end?</a:t>
+            </a:r>
+          </a:p>
+          <a:p>
+            <a:pPr marL="285750" indent="-285750">
+              <a:buFont typeface="Wingdings" panose="05000000000000000000" pitchFamily="2" charset="2"/>
+              <a:buChar char="q"/>
+            </a:pPr>
+            <a:endParaRPr lang="en-US" sz="2800" dirty="0"/>
+          </a:p>
+          <a:p>
+            <a:pPr marL="285750" indent="-285750">
+              <a:buFont typeface="Wingdings" panose="05000000000000000000" pitchFamily="2" charset="2"/>
+              <a:buChar char="q"/>
+            </a:pPr>
+            <a:r>
+              <a:rPr lang="en-US" sz="2800" dirty="0"/>
+              <a:t> The plots on the next slide contain the pickup and drop-off locations of the randomly chosen 3000 slowest trips (whose effective speed is at least two times slower than the average).  The plots show that the slowest trips originate and end almost exclusively in Manhattan.</a:t>
+            </a:r>
+          </a:p>
+          <a:p>
+            <a:pPr marL="285750" indent="-285750">
+              <a:buFont typeface="Wingdings" panose="05000000000000000000" pitchFamily="2" charset="2"/>
+              <a:buChar char="q"/>
+            </a:pPr>
+            <a:endParaRPr lang="en-US" sz="2800" dirty="0"/>
+          </a:p>
+          <a:p>
+            <a:pPr marL="285750" indent="-285750">
+              <a:buFont typeface="Wingdings" panose="05000000000000000000" pitchFamily="2" charset="2"/>
+              <a:buChar char="q"/>
+            </a:pPr>
+            <a:r>
+              <a:rPr lang="en-US" sz="2800" dirty="0"/>
+              <a:t> One can conclude that the majority of people who take cabs travel from/to Manhattan, and that the effective speed of the trip is determined by how busy the traffic in Manhattan is. Given this, one can recommend the estimation of the time of the trip by simply looking at the traffic congestion near Manhattan.</a:t>
+            </a:r>
+            <a:endParaRPr lang="ru-RU" sz="2800" dirty="0"/>
+          </a:p>
+        </p:txBody>
+      </p:sp>
+    </p:spTree>
+    <p:extLst>
+      <p:ext uri="{BB962C8B-B14F-4D97-AF65-F5344CB8AC3E}">
+        <p14:creationId xmlns:p14="http://schemas.microsoft.com/office/powerpoint/2010/main" val="2011119325"/>
+      </p:ext>
+    </p:extLst>
+  </p:cSld>
+  <p:clrMapOvr>
+    <a:masterClrMapping/>
+  </p:clrMapOvr>
+</p:sld>
+</file>
+
+<file path=ppt/slides/slide14.xml><?xml version="1.0" encoding="utf-8"?>
+<p:sld xmlns:a="http://schemas.openxmlformats.org/drawingml/2006/main" xmlns:r="http://schemas.openxmlformats.org/officeDocument/2006/relationships" xmlns:p="http://schemas.openxmlformats.org/presentationml/2006/main">
+  <p:cSld>
+    <p:spTree>
+      <p:nvGrpSpPr>
+        <p:cNvPr id="1" name=""/>
+        <p:cNvGrpSpPr/>
+        <p:nvPr/>
+      </p:nvGrpSpPr>
+      <p:grpSpPr>
+        <a:xfrm>
+          <a:off x="0" y="0"/>
+          <a:ext cx="0" cy="0"/>
+          <a:chOff x="0" y="0"/>
+          <a:chExt cx="0" cy="0"/>
+        </a:xfrm>
+      </p:grpSpPr>
+      <p:graphicFrame>
+        <p:nvGraphicFramePr>
+          <p:cNvPr id="2" name="Объект 1">
+            <a:extLst>
+              <a:ext uri="{FF2B5EF4-FFF2-40B4-BE49-F238E27FC236}">
+                <a16:creationId xmlns:a16="http://schemas.microsoft.com/office/drawing/2014/main" id="{F094F06D-9EAC-4EC9-B6F6-2B4340A5D70F}"/>
+              </a:ext>
+            </a:extLst>
+          </p:cNvPr>
+          <p:cNvGraphicFramePr>
+            <a:graphicFrameLocks noChangeAspect="1"/>
+          </p:cNvGraphicFramePr>
+          <p:nvPr>
+            <p:extLst>
+              <p:ext uri="{D42A27DB-BD31-4B8C-83A1-F6EECF244321}">
+                <p14:modId xmlns:p14="http://schemas.microsoft.com/office/powerpoint/2010/main" val="2433441195"/>
+              </p:ext>
+            </p:extLst>
+          </p:nvPr>
+        </p:nvGraphicFramePr>
+        <p:xfrm>
+          <a:off x="-1343025" y="76200"/>
+          <a:ext cx="7696200" cy="7696200"/>
+        </p:xfrm>
+        <a:graphic>
+          <a:graphicData uri="http://schemas.openxmlformats.org/presentationml/2006/ole">
+            <mc:AlternateContent xmlns:mc="http://schemas.openxmlformats.org/markup-compatibility/2006">
+              <mc:Choice xmlns:v="urn:schemas-microsoft-com:vml" Requires="v">
+                <p:oleObj spid="_x0000_s4100" name="Acrobat Document" r:id="rId3" imgW="6857708" imgH="6857716" progId="AcroExch.Document.11">
+                  <p:embed/>
+                </p:oleObj>
+              </mc:Choice>
+              <mc:Fallback>
+                <p:oleObj name="Acrobat Document" r:id="rId3" imgW="6857708" imgH="6857716" progId="AcroExch.Document.11">
+                  <p:embed/>
+                  <p:pic>
+                    <p:nvPicPr>
+                      <p:cNvPr id="0" name=""/>
+                      <p:cNvPicPr/>
+                      <p:nvPr/>
+                    </p:nvPicPr>
+                    <p:blipFill>
+                      <a:blip r:embed="rId4"/>
+                      <a:stretch>
+                        <a:fillRect/>
+                      </a:stretch>
+                    </p:blipFill>
+                    <p:spPr>
+                      <a:xfrm>
+                        <a:off x="-1343025" y="76200"/>
+                        <a:ext cx="7696200" cy="7696200"/>
+                      </a:xfrm>
+                      <a:prstGeom prst="rect">
+                        <a:avLst/>
+                      </a:prstGeom>
+                    </p:spPr>
+                  </p:pic>
+                </p:oleObj>
+              </mc:Fallback>
+            </mc:AlternateContent>
+          </a:graphicData>
+        </a:graphic>
+      </p:graphicFrame>
+      <p:graphicFrame>
+        <p:nvGraphicFramePr>
+          <p:cNvPr id="4" name="Объект 3">
+            <a:extLst>
+              <a:ext uri="{FF2B5EF4-FFF2-40B4-BE49-F238E27FC236}">
+                <a16:creationId xmlns:a16="http://schemas.microsoft.com/office/drawing/2014/main" id="{2F3D57C1-F064-479A-A2DA-D7FC9424C0D4}"/>
+              </a:ext>
+            </a:extLst>
+          </p:cNvPr>
+          <p:cNvGraphicFramePr>
+            <a:graphicFrameLocks noChangeAspect="1"/>
+          </p:cNvGraphicFramePr>
+          <p:nvPr>
+            <p:extLst>
+              <p:ext uri="{D42A27DB-BD31-4B8C-83A1-F6EECF244321}">
+                <p14:modId xmlns:p14="http://schemas.microsoft.com/office/powerpoint/2010/main" val="1874635705"/>
+              </p:ext>
+            </p:extLst>
+          </p:nvPr>
+        </p:nvGraphicFramePr>
+        <p:xfrm>
+          <a:off x="5772149" y="0"/>
+          <a:ext cx="7848601" cy="7848601"/>
+        </p:xfrm>
+        <a:graphic>
+          <a:graphicData uri="http://schemas.openxmlformats.org/presentationml/2006/ole">
+            <mc:AlternateContent xmlns:mc="http://schemas.openxmlformats.org/markup-compatibility/2006">
+              <mc:Choice xmlns:v="urn:schemas-microsoft-com:vml" Requires="v">
+                <p:oleObj spid="_x0000_s4101" name="Acrobat Document" r:id="rId5" imgW="6857708" imgH="6857716" progId="AcroExch.Document.11">
+                  <p:embed/>
+                </p:oleObj>
+              </mc:Choice>
+              <mc:Fallback>
+                <p:oleObj name="Acrobat Document" r:id="rId5" imgW="6857708" imgH="6857716" progId="AcroExch.Document.11">
+                  <p:embed/>
+                  <p:pic>
+                    <p:nvPicPr>
+                      <p:cNvPr id="0" name=""/>
+                      <p:cNvPicPr/>
+                      <p:nvPr/>
+                    </p:nvPicPr>
+                    <p:blipFill>
+                      <a:blip r:embed="rId6"/>
+                      <a:stretch>
+                        <a:fillRect/>
+                      </a:stretch>
+                    </p:blipFill>
+                    <p:spPr>
+                      <a:xfrm>
+                        <a:off x="5772149" y="0"/>
+                        <a:ext cx="7848601" cy="7848601"/>
+                      </a:xfrm>
+                      <a:prstGeom prst="rect">
+                        <a:avLst/>
+                      </a:prstGeom>
+                    </p:spPr>
+                  </p:pic>
+                </p:oleObj>
+              </mc:Fallback>
+            </mc:AlternateContent>
+          </a:graphicData>
+        </a:graphic>
+      </p:graphicFrame>
+    </p:spTree>
+    <p:extLst>
+      <p:ext uri="{BB962C8B-B14F-4D97-AF65-F5344CB8AC3E}">
+        <p14:creationId xmlns:p14="http://schemas.microsoft.com/office/powerpoint/2010/main" val="246759062"/>
+      </p:ext>
+    </p:extLst>
+  </p:cSld>
+  <p:clrMapOvr>
+    <a:masterClrMapping/>
+  </p:clrMapOvr>
+</p:sld>
+</file>
+
 <file path=ppt/slides/slide2.xml><?xml version="1.0" encoding="utf-8"?>
 <p:sld xmlns:a="http://schemas.openxmlformats.org/drawingml/2006/main" xmlns:r="http://schemas.openxmlformats.org/officeDocument/2006/relationships" xmlns:p="http://schemas.openxmlformats.org/presentationml/2006/main">
   <p:cSld>
@@ -5545,7 +5806,7 @@
           <a:graphicData uri="http://schemas.openxmlformats.org/presentationml/2006/ole">
             <mc:AlternateContent xmlns:mc="http://schemas.openxmlformats.org/markup-compatibility/2006">
               <mc:Choice xmlns:v="urn:schemas-microsoft-com:vml" Requires="v">
-                <p:oleObj spid="_x0000_s1054" name="Worksheet" r:id="rId3" imgW="5791096" imgH="1724189" progId="Excel.Sheet.12">
+                <p:oleObj spid="_x0000_s1057" name="Worksheet" r:id="rId3" imgW="5791096" imgH="1724189" progId="Excel.Sheet.12">
                   <p:embed/>
                 </p:oleObj>
               </mc:Choice>

</xml_diff>